<commit_message>
increase version number to 0.6.14
</commit_message>
<xml_diff>
--- a/docs/source/diagrams.pptx
+++ b/docs/source/diagrams.pptx
@@ -7,6 +7,7 @@
   <p:sldIdLst>
     <p:sldId id="256" r:id="rId2"/>
     <p:sldId id="257" r:id="rId3"/>
+    <p:sldId id="258" r:id="rId4"/>
   </p:sldIdLst>
   <p:sldSz cx="10799763" cy="10799763"/>
   <p:notesSz cx="6858000" cy="9144000"/>
@@ -255,7 +256,7 @@
           <a:p>
             <a:fld id="{03C483EE-6330-45F5-89B7-D6BA7E3B4FCB}" type="datetimeFigureOut">
               <a:rPr lang="en-GB" smtClean="0"/>
-              <a:t>22/10/2024</a:t>
+              <a:t>15/01/2025</a:t>
             </a:fld>
             <a:endParaRPr lang="en-GB"/>
           </a:p>
@@ -425,7 +426,7 @@
           <a:p>
             <a:fld id="{03C483EE-6330-45F5-89B7-D6BA7E3B4FCB}" type="datetimeFigureOut">
               <a:rPr lang="en-GB" smtClean="0"/>
-              <a:t>22/10/2024</a:t>
+              <a:t>15/01/2025</a:t>
             </a:fld>
             <a:endParaRPr lang="en-GB"/>
           </a:p>
@@ -605,7 +606,7 @@
           <a:p>
             <a:fld id="{03C483EE-6330-45F5-89B7-D6BA7E3B4FCB}" type="datetimeFigureOut">
               <a:rPr lang="en-GB" smtClean="0"/>
-              <a:t>22/10/2024</a:t>
+              <a:t>15/01/2025</a:t>
             </a:fld>
             <a:endParaRPr lang="en-GB"/>
           </a:p>
@@ -775,7 +776,7 @@
           <a:p>
             <a:fld id="{03C483EE-6330-45F5-89B7-D6BA7E3B4FCB}" type="datetimeFigureOut">
               <a:rPr lang="en-GB" smtClean="0"/>
-              <a:t>22/10/2024</a:t>
+              <a:t>15/01/2025</a:t>
             </a:fld>
             <a:endParaRPr lang="en-GB"/>
           </a:p>
@@ -1021,7 +1022,7 @@
           <a:p>
             <a:fld id="{03C483EE-6330-45F5-89B7-D6BA7E3B4FCB}" type="datetimeFigureOut">
               <a:rPr lang="en-GB" smtClean="0"/>
-              <a:t>22/10/2024</a:t>
+              <a:t>15/01/2025</a:t>
             </a:fld>
             <a:endParaRPr lang="en-GB"/>
           </a:p>
@@ -1253,7 +1254,7 @@
           <a:p>
             <a:fld id="{03C483EE-6330-45F5-89B7-D6BA7E3B4FCB}" type="datetimeFigureOut">
               <a:rPr lang="en-GB" smtClean="0"/>
-              <a:t>22/10/2024</a:t>
+              <a:t>15/01/2025</a:t>
             </a:fld>
             <a:endParaRPr lang="en-GB"/>
           </a:p>
@@ -1620,7 +1621,7 @@
           <a:p>
             <a:fld id="{03C483EE-6330-45F5-89B7-D6BA7E3B4FCB}" type="datetimeFigureOut">
               <a:rPr lang="en-GB" smtClean="0"/>
-              <a:t>22/10/2024</a:t>
+              <a:t>15/01/2025</a:t>
             </a:fld>
             <a:endParaRPr lang="en-GB"/>
           </a:p>
@@ -1738,7 +1739,7 @@
           <a:p>
             <a:fld id="{03C483EE-6330-45F5-89B7-D6BA7E3B4FCB}" type="datetimeFigureOut">
               <a:rPr lang="en-GB" smtClean="0"/>
-              <a:t>22/10/2024</a:t>
+              <a:t>15/01/2025</a:t>
             </a:fld>
             <a:endParaRPr lang="en-GB"/>
           </a:p>
@@ -1833,7 +1834,7 @@
           <a:p>
             <a:fld id="{03C483EE-6330-45F5-89B7-D6BA7E3B4FCB}" type="datetimeFigureOut">
               <a:rPr lang="en-GB" smtClean="0"/>
-              <a:t>22/10/2024</a:t>
+              <a:t>15/01/2025</a:t>
             </a:fld>
             <a:endParaRPr lang="en-GB"/>
           </a:p>
@@ -2110,7 +2111,7 @@
           <a:p>
             <a:fld id="{03C483EE-6330-45F5-89B7-D6BA7E3B4FCB}" type="datetimeFigureOut">
               <a:rPr lang="en-GB" smtClean="0"/>
-              <a:t>22/10/2024</a:t>
+              <a:t>15/01/2025</a:t>
             </a:fld>
             <a:endParaRPr lang="en-GB"/>
           </a:p>
@@ -2367,7 +2368,7 @@
           <a:p>
             <a:fld id="{03C483EE-6330-45F5-89B7-D6BA7E3B4FCB}" type="datetimeFigureOut">
               <a:rPr lang="en-GB" smtClean="0"/>
-              <a:t>22/10/2024</a:t>
+              <a:t>15/01/2025</a:t>
             </a:fld>
             <a:endParaRPr lang="en-GB"/>
           </a:p>
@@ -2580,7 +2581,7 @@
           <a:p>
             <a:fld id="{03C483EE-6330-45F5-89B7-D6BA7E3B4FCB}" type="datetimeFigureOut">
               <a:rPr lang="en-GB" smtClean="0"/>
-              <a:t>22/10/2024</a:t>
+              <a:t>15/01/2025</a:t>
             </a:fld>
             <a:endParaRPr lang="en-GB"/>
           </a:p>
@@ -5339,6 +5340,923 @@
     <p:extLst>
       <p:ext uri="{BB962C8B-B14F-4D97-AF65-F5344CB8AC3E}">
         <p14:creationId xmlns:p14="http://schemas.microsoft.com/office/powerpoint/2010/main" val="3875997715"/>
+      </p:ext>
+    </p:extLst>
+  </p:cSld>
+  <p:clrMapOvr>
+    <a:masterClrMapping/>
+  </p:clrMapOvr>
+</p:sld>
+</file>
+
+<file path=ppt/slides/slide3.xml><?xml version="1.0" encoding="utf-8"?>
+<p:sld xmlns:a="http://schemas.openxmlformats.org/drawingml/2006/main" xmlns:r="http://schemas.openxmlformats.org/officeDocument/2006/relationships" xmlns:p="http://schemas.openxmlformats.org/presentationml/2006/main">
+  <p:cSld>
+    <p:spTree>
+      <p:nvGrpSpPr>
+        <p:cNvPr id="1" name=""/>
+        <p:cNvGrpSpPr/>
+        <p:nvPr/>
+      </p:nvGrpSpPr>
+      <p:grpSpPr>
+        <a:xfrm>
+          <a:off x="0" y="0"/>
+          <a:ext cx="0" cy="0"/>
+          <a:chOff x="0" y="0"/>
+          <a:chExt cx="0" cy="0"/>
+        </a:xfrm>
+      </p:grpSpPr>
+      <p:sp>
+        <p:nvSpPr>
+          <p:cNvPr id="3" name="Rectangle 2">
+            <a:extLst>
+              <a:ext uri="{FF2B5EF4-FFF2-40B4-BE49-F238E27FC236}">
+                <a16:creationId xmlns:a16="http://schemas.microsoft.com/office/drawing/2014/main" id="{25A4181C-AFBE-DC8F-CCC6-37FDC8804EA9}"/>
+              </a:ext>
+            </a:extLst>
+          </p:cNvPr>
+          <p:cNvSpPr/>
+          <p:nvPr/>
+        </p:nvSpPr>
+        <p:spPr>
+          <a:xfrm>
+            <a:off x="4739923" y="826933"/>
+            <a:ext cx="1319915" cy="675861"/>
+          </a:xfrm>
+          <a:prstGeom prst="rect">
+            <a:avLst/>
+          </a:prstGeom>
+        </p:spPr>
+        <p:style>
+          <a:lnRef idx="2">
+            <a:schemeClr val="accent1">
+              <a:shade val="15000"/>
+            </a:schemeClr>
+          </a:lnRef>
+          <a:fillRef idx="1">
+            <a:schemeClr val="accent1"/>
+          </a:fillRef>
+          <a:effectRef idx="0">
+            <a:schemeClr val="accent1"/>
+          </a:effectRef>
+          <a:fontRef idx="minor">
+            <a:schemeClr val="lt1"/>
+          </a:fontRef>
+        </p:style>
+        <p:txBody>
+          <a:bodyPr rtlCol="0" anchor="ctr"/>
+          <a:lstStyle/>
+          <a:p>
+            <a:pPr algn="ctr"/>
+            <a:r>
+              <a:rPr lang="en-GB" b="1" dirty="0"/>
+              <a:t>utils</a:t>
+            </a:r>
+          </a:p>
+        </p:txBody>
+      </p:sp>
+      <p:sp>
+        <p:nvSpPr>
+          <p:cNvPr id="4" name="Rectangle 3">
+            <a:extLst>
+              <a:ext uri="{FF2B5EF4-FFF2-40B4-BE49-F238E27FC236}">
+                <a16:creationId xmlns:a16="http://schemas.microsoft.com/office/drawing/2014/main" id="{1A4B0A40-FC63-5399-76F7-203F21D13A9A}"/>
+              </a:ext>
+            </a:extLst>
+          </p:cNvPr>
+          <p:cNvSpPr/>
+          <p:nvPr/>
+        </p:nvSpPr>
+        <p:spPr>
+          <a:xfrm>
+            <a:off x="4010867" y="2613703"/>
+            <a:ext cx="1319915" cy="675861"/>
+          </a:xfrm>
+          <a:prstGeom prst="rect">
+            <a:avLst/>
+          </a:prstGeom>
+        </p:spPr>
+        <p:style>
+          <a:lnRef idx="2">
+            <a:schemeClr val="accent1">
+              <a:shade val="15000"/>
+            </a:schemeClr>
+          </a:lnRef>
+          <a:fillRef idx="1">
+            <a:schemeClr val="accent1"/>
+          </a:fillRef>
+          <a:effectRef idx="0">
+            <a:schemeClr val="accent1"/>
+          </a:effectRef>
+          <a:fontRef idx="minor">
+            <a:schemeClr val="lt1"/>
+          </a:fontRef>
+        </p:style>
+        <p:txBody>
+          <a:bodyPr rtlCol="0" anchor="ctr"/>
+          <a:lstStyle/>
+          <a:p>
+            <a:pPr algn="ctr"/>
+            <a:r>
+              <a:rPr lang="en-GB" b="1" dirty="0"/>
+              <a:t>pk</a:t>
+            </a:r>
+          </a:p>
+        </p:txBody>
+      </p:sp>
+      <p:cxnSp>
+        <p:nvCxnSpPr>
+          <p:cNvPr id="6" name="Straight Arrow Connector 5">
+            <a:extLst>
+              <a:ext uri="{FF2B5EF4-FFF2-40B4-BE49-F238E27FC236}">
+                <a16:creationId xmlns:a16="http://schemas.microsoft.com/office/drawing/2014/main" id="{5279F00D-F7A9-5D0F-855C-A2DDB2B1C27A}"/>
+              </a:ext>
+            </a:extLst>
+          </p:cNvPr>
+          <p:cNvCxnSpPr>
+            <a:stCxn id="3" idx="2"/>
+            <a:endCxn id="4" idx="0"/>
+          </p:cNvCxnSpPr>
+          <p:nvPr/>
+        </p:nvCxnSpPr>
+        <p:spPr>
+          <a:xfrm flipH="1">
+            <a:off x="4670825" y="1502794"/>
+            <a:ext cx="729056" cy="1110909"/>
+          </a:xfrm>
+          <a:prstGeom prst="straightConnector1">
+            <a:avLst/>
+          </a:prstGeom>
+          <a:ln w="76200">
+            <a:tailEnd type="triangle"/>
+          </a:ln>
+        </p:spPr>
+        <p:style>
+          <a:lnRef idx="2">
+            <a:schemeClr val="accent1"/>
+          </a:lnRef>
+          <a:fillRef idx="0">
+            <a:schemeClr val="accent1"/>
+          </a:fillRef>
+          <a:effectRef idx="1">
+            <a:schemeClr val="accent1"/>
+          </a:effectRef>
+          <a:fontRef idx="minor">
+            <a:schemeClr val="tx1"/>
+          </a:fontRef>
+        </p:style>
+      </p:cxnSp>
+      <p:sp>
+        <p:nvSpPr>
+          <p:cNvPr id="2" name="Rectangle 1">
+            <a:extLst>
+              <a:ext uri="{FF2B5EF4-FFF2-40B4-BE49-F238E27FC236}">
+                <a16:creationId xmlns:a16="http://schemas.microsoft.com/office/drawing/2014/main" id="{A7B07E2C-1582-D1E3-AF01-12EB79F6AE62}"/>
+              </a:ext>
+            </a:extLst>
+          </p:cNvPr>
+          <p:cNvSpPr/>
+          <p:nvPr/>
+        </p:nvSpPr>
+        <p:spPr>
+          <a:xfrm>
+            <a:off x="1393751" y="2613704"/>
+            <a:ext cx="1319915" cy="675861"/>
+          </a:xfrm>
+          <a:prstGeom prst="rect">
+            <a:avLst/>
+          </a:prstGeom>
+        </p:spPr>
+        <p:style>
+          <a:lnRef idx="2">
+            <a:schemeClr val="accent1">
+              <a:shade val="15000"/>
+            </a:schemeClr>
+          </a:lnRef>
+          <a:fillRef idx="1">
+            <a:schemeClr val="accent1"/>
+          </a:fillRef>
+          <a:effectRef idx="0">
+            <a:schemeClr val="accent1"/>
+          </a:effectRef>
+          <a:fontRef idx="minor">
+            <a:schemeClr val="lt1"/>
+          </a:fontRef>
+        </p:style>
+        <p:txBody>
+          <a:bodyPr rtlCol="0" anchor="ctr"/>
+          <a:lstStyle/>
+          <a:p>
+            <a:pPr algn="ctr"/>
+            <a:r>
+              <a:rPr lang="en-GB" b="1" dirty="0"/>
+              <a:t>lib</a:t>
+            </a:r>
+          </a:p>
+        </p:txBody>
+      </p:sp>
+      <p:cxnSp>
+        <p:nvCxnSpPr>
+          <p:cNvPr id="5" name="Straight Arrow Connector 4">
+            <a:extLst>
+              <a:ext uri="{FF2B5EF4-FFF2-40B4-BE49-F238E27FC236}">
+                <a16:creationId xmlns:a16="http://schemas.microsoft.com/office/drawing/2014/main" id="{F656F6DE-702D-0F55-E072-7411B0C4E635}"/>
+              </a:ext>
+            </a:extLst>
+          </p:cNvPr>
+          <p:cNvCxnSpPr>
+            <a:cxnSpLocks/>
+            <a:stCxn id="3" idx="2"/>
+            <a:endCxn id="2" idx="0"/>
+          </p:cNvCxnSpPr>
+          <p:nvPr/>
+        </p:nvCxnSpPr>
+        <p:spPr>
+          <a:xfrm flipH="1">
+            <a:off x="2053709" y="1502794"/>
+            <a:ext cx="3346172" cy="1110910"/>
+          </a:xfrm>
+          <a:prstGeom prst="straightConnector1">
+            <a:avLst/>
+          </a:prstGeom>
+          <a:ln w="76200">
+            <a:tailEnd type="triangle"/>
+          </a:ln>
+        </p:spPr>
+        <p:style>
+          <a:lnRef idx="2">
+            <a:schemeClr val="accent1"/>
+          </a:lnRef>
+          <a:fillRef idx="0">
+            <a:schemeClr val="accent1"/>
+          </a:fillRef>
+          <a:effectRef idx="1">
+            <a:schemeClr val="accent1"/>
+          </a:effectRef>
+          <a:fontRef idx="minor">
+            <a:schemeClr val="tx1"/>
+          </a:fontRef>
+        </p:style>
+      </p:cxnSp>
+      <p:sp>
+        <p:nvSpPr>
+          <p:cNvPr id="10" name="Rectangle 9">
+            <a:extLst>
+              <a:ext uri="{FF2B5EF4-FFF2-40B4-BE49-F238E27FC236}">
+                <a16:creationId xmlns:a16="http://schemas.microsoft.com/office/drawing/2014/main" id="{57994BE4-20F5-A8DD-B600-1EA724669430}"/>
+              </a:ext>
+            </a:extLst>
+          </p:cNvPr>
+          <p:cNvSpPr/>
+          <p:nvPr/>
+        </p:nvSpPr>
+        <p:spPr>
+          <a:xfrm>
+            <a:off x="2787831" y="5093183"/>
+            <a:ext cx="1319915" cy="675861"/>
+          </a:xfrm>
+          <a:prstGeom prst="rect">
+            <a:avLst/>
+          </a:prstGeom>
+        </p:spPr>
+        <p:style>
+          <a:lnRef idx="2">
+            <a:schemeClr val="accent1">
+              <a:shade val="15000"/>
+            </a:schemeClr>
+          </a:lnRef>
+          <a:fillRef idx="1">
+            <a:schemeClr val="accent1"/>
+          </a:fillRef>
+          <a:effectRef idx="0">
+            <a:schemeClr val="accent1"/>
+          </a:effectRef>
+          <a:fontRef idx="minor">
+            <a:schemeClr val="lt1"/>
+          </a:fontRef>
+        </p:style>
+        <p:txBody>
+          <a:bodyPr rtlCol="0" anchor="ctr"/>
+          <a:lstStyle/>
+          <a:p>
+            <a:pPr algn="ctr"/>
+            <a:r>
+              <a:rPr lang="en-GB" b="1" dirty="0" err="1"/>
+              <a:t>pk_lib</a:t>
+            </a:r>
+            <a:endParaRPr lang="en-GB" b="1" dirty="0"/>
+          </a:p>
+        </p:txBody>
+      </p:sp>
+      <p:cxnSp>
+        <p:nvCxnSpPr>
+          <p:cNvPr id="11" name="Straight Arrow Connector 10">
+            <a:extLst>
+              <a:ext uri="{FF2B5EF4-FFF2-40B4-BE49-F238E27FC236}">
+                <a16:creationId xmlns:a16="http://schemas.microsoft.com/office/drawing/2014/main" id="{E081EBD6-A86D-573D-A8D5-1F2A33648C8D}"/>
+              </a:ext>
+            </a:extLst>
+          </p:cNvPr>
+          <p:cNvCxnSpPr>
+            <a:cxnSpLocks/>
+            <a:stCxn id="4" idx="2"/>
+            <a:endCxn id="10" idx="0"/>
+          </p:cNvCxnSpPr>
+          <p:nvPr/>
+        </p:nvCxnSpPr>
+        <p:spPr>
+          <a:xfrm flipH="1">
+            <a:off x="3447789" y="3289564"/>
+            <a:ext cx="1223036" cy="1803619"/>
+          </a:xfrm>
+          <a:prstGeom prst="straightConnector1">
+            <a:avLst/>
+          </a:prstGeom>
+          <a:ln w="76200">
+            <a:tailEnd type="triangle"/>
+          </a:ln>
+        </p:spPr>
+        <p:style>
+          <a:lnRef idx="2">
+            <a:schemeClr val="accent1"/>
+          </a:lnRef>
+          <a:fillRef idx="0">
+            <a:schemeClr val="accent1"/>
+          </a:fillRef>
+          <a:effectRef idx="1">
+            <a:schemeClr val="accent1"/>
+          </a:effectRef>
+          <a:fontRef idx="minor">
+            <a:schemeClr val="tx1"/>
+          </a:fontRef>
+        </p:style>
+      </p:cxnSp>
+      <p:sp>
+        <p:nvSpPr>
+          <p:cNvPr id="14" name="Rectangle 13">
+            <a:extLst>
+              <a:ext uri="{FF2B5EF4-FFF2-40B4-BE49-F238E27FC236}">
+                <a16:creationId xmlns:a16="http://schemas.microsoft.com/office/drawing/2014/main" id="{DD23C8C0-6138-A171-D67C-040B4BA07EED}"/>
+              </a:ext>
+            </a:extLst>
+          </p:cNvPr>
+          <p:cNvSpPr/>
+          <p:nvPr/>
+        </p:nvSpPr>
+        <p:spPr>
+          <a:xfrm>
+            <a:off x="276363" y="5093184"/>
+            <a:ext cx="1319915" cy="675861"/>
+          </a:xfrm>
+          <a:prstGeom prst="rect">
+            <a:avLst/>
+          </a:prstGeom>
+        </p:spPr>
+        <p:style>
+          <a:lnRef idx="2">
+            <a:schemeClr val="accent1">
+              <a:shade val="15000"/>
+            </a:schemeClr>
+          </a:lnRef>
+          <a:fillRef idx="1">
+            <a:schemeClr val="accent1"/>
+          </a:fillRef>
+          <a:effectRef idx="0">
+            <a:schemeClr val="accent1"/>
+          </a:effectRef>
+          <a:fontRef idx="minor">
+            <a:schemeClr val="lt1"/>
+          </a:fontRef>
+        </p:style>
+        <p:txBody>
+          <a:bodyPr rtlCol="0" anchor="ctr"/>
+          <a:lstStyle/>
+          <a:p>
+            <a:pPr algn="ctr"/>
+            <a:r>
+              <a:rPr lang="en-GB" b="1" dirty="0" err="1"/>
+              <a:t>pk_aorta</a:t>
+            </a:r>
+            <a:endParaRPr lang="en-GB" b="1" dirty="0"/>
+          </a:p>
+        </p:txBody>
+      </p:sp>
+      <p:cxnSp>
+        <p:nvCxnSpPr>
+          <p:cNvPr id="15" name="Straight Arrow Connector 14">
+            <a:extLst>
+              <a:ext uri="{FF2B5EF4-FFF2-40B4-BE49-F238E27FC236}">
+                <a16:creationId xmlns:a16="http://schemas.microsoft.com/office/drawing/2014/main" id="{C12D780B-B27F-D890-42FB-8973A17C96B6}"/>
+              </a:ext>
+            </a:extLst>
+          </p:cNvPr>
+          <p:cNvCxnSpPr>
+            <a:cxnSpLocks/>
+            <a:stCxn id="4" idx="2"/>
+            <a:endCxn id="14" idx="0"/>
+          </p:cNvCxnSpPr>
+          <p:nvPr/>
+        </p:nvCxnSpPr>
+        <p:spPr>
+          <a:xfrm flipH="1">
+            <a:off x="936321" y="3289564"/>
+            <a:ext cx="3734504" cy="1803620"/>
+          </a:xfrm>
+          <a:prstGeom prst="straightConnector1">
+            <a:avLst/>
+          </a:prstGeom>
+          <a:ln w="76200">
+            <a:tailEnd type="triangle"/>
+          </a:ln>
+        </p:spPr>
+        <p:style>
+          <a:lnRef idx="2">
+            <a:schemeClr val="accent1"/>
+          </a:lnRef>
+          <a:fillRef idx="0">
+            <a:schemeClr val="accent1"/>
+          </a:fillRef>
+          <a:effectRef idx="1">
+            <a:schemeClr val="accent1"/>
+          </a:effectRef>
+          <a:fontRef idx="minor">
+            <a:schemeClr val="tx1"/>
+          </a:fontRef>
+        </p:style>
+      </p:cxnSp>
+      <p:cxnSp>
+        <p:nvCxnSpPr>
+          <p:cNvPr id="18" name="Straight Arrow Connector 17">
+            <a:extLst>
+              <a:ext uri="{FF2B5EF4-FFF2-40B4-BE49-F238E27FC236}">
+                <a16:creationId xmlns:a16="http://schemas.microsoft.com/office/drawing/2014/main" id="{89700747-F89D-162E-C974-1AC4AB06661F}"/>
+              </a:ext>
+            </a:extLst>
+          </p:cNvPr>
+          <p:cNvCxnSpPr>
+            <a:cxnSpLocks/>
+            <a:stCxn id="2" idx="2"/>
+            <a:endCxn id="14" idx="0"/>
+          </p:cNvCxnSpPr>
+          <p:nvPr/>
+        </p:nvCxnSpPr>
+        <p:spPr>
+          <a:xfrm flipH="1">
+            <a:off x="936321" y="3289565"/>
+            <a:ext cx="1117388" cy="1803619"/>
+          </a:xfrm>
+          <a:prstGeom prst="straightConnector1">
+            <a:avLst/>
+          </a:prstGeom>
+          <a:ln w="76200">
+            <a:tailEnd type="triangle"/>
+          </a:ln>
+        </p:spPr>
+        <p:style>
+          <a:lnRef idx="2">
+            <a:schemeClr val="accent1"/>
+          </a:lnRef>
+          <a:fillRef idx="0">
+            <a:schemeClr val="accent1"/>
+          </a:fillRef>
+          <a:effectRef idx="1">
+            <a:schemeClr val="accent1"/>
+          </a:effectRef>
+          <a:fontRef idx="minor">
+            <a:schemeClr val="tx1"/>
+          </a:fontRef>
+        </p:style>
+      </p:cxnSp>
+      <p:sp>
+        <p:nvSpPr>
+          <p:cNvPr id="9" name="Rectangle 8">
+            <a:extLst>
+              <a:ext uri="{FF2B5EF4-FFF2-40B4-BE49-F238E27FC236}">
+                <a16:creationId xmlns:a16="http://schemas.microsoft.com/office/drawing/2014/main" id="{20535ED4-1F93-EBAD-1D9C-9CDAA1B5BE9F}"/>
+              </a:ext>
+            </a:extLst>
+          </p:cNvPr>
+          <p:cNvSpPr/>
+          <p:nvPr/>
+        </p:nvSpPr>
+        <p:spPr>
+          <a:xfrm>
+            <a:off x="6686906" y="826933"/>
+            <a:ext cx="1319915" cy="675861"/>
+          </a:xfrm>
+          <a:prstGeom prst="rect">
+            <a:avLst/>
+          </a:prstGeom>
+        </p:spPr>
+        <p:style>
+          <a:lnRef idx="2">
+            <a:schemeClr val="accent1">
+              <a:shade val="15000"/>
+            </a:schemeClr>
+          </a:lnRef>
+          <a:fillRef idx="1">
+            <a:schemeClr val="accent1"/>
+          </a:fillRef>
+          <a:effectRef idx="0">
+            <a:schemeClr val="accent1"/>
+          </a:effectRef>
+          <a:fontRef idx="minor">
+            <a:schemeClr val="lt1"/>
+          </a:fontRef>
+        </p:style>
+        <p:txBody>
+          <a:bodyPr rtlCol="0" anchor="ctr"/>
+          <a:lstStyle/>
+          <a:p>
+            <a:pPr algn="ctr"/>
+            <a:r>
+              <a:rPr lang="en-GB" b="1" dirty="0" err="1"/>
+              <a:t>rel</a:t>
+            </a:r>
+            <a:endParaRPr lang="en-GB" b="1" dirty="0"/>
+          </a:p>
+        </p:txBody>
+      </p:sp>
+      <p:sp>
+        <p:nvSpPr>
+          <p:cNvPr id="16" name="Rectangle 15">
+            <a:extLst>
+              <a:ext uri="{FF2B5EF4-FFF2-40B4-BE49-F238E27FC236}">
+                <a16:creationId xmlns:a16="http://schemas.microsoft.com/office/drawing/2014/main" id="{191B1FF3-9F7C-D472-4665-26B04BD1662D}"/>
+              </a:ext>
+            </a:extLst>
+          </p:cNvPr>
+          <p:cNvSpPr/>
+          <p:nvPr/>
+        </p:nvSpPr>
+        <p:spPr>
+          <a:xfrm>
+            <a:off x="8437281" y="826934"/>
+            <a:ext cx="1319915" cy="675861"/>
+          </a:xfrm>
+          <a:prstGeom prst="rect">
+            <a:avLst/>
+          </a:prstGeom>
+        </p:spPr>
+        <p:style>
+          <a:lnRef idx="2">
+            <a:schemeClr val="accent1">
+              <a:shade val="15000"/>
+            </a:schemeClr>
+          </a:lnRef>
+          <a:fillRef idx="1">
+            <a:schemeClr val="accent1"/>
+          </a:fillRef>
+          <a:effectRef idx="0">
+            <a:schemeClr val="accent1"/>
+          </a:effectRef>
+          <a:fontRef idx="minor">
+            <a:schemeClr val="lt1"/>
+          </a:fontRef>
+        </p:style>
+        <p:txBody>
+          <a:bodyPr rtlCol="0" anchor="ctr"/>
+          <a:lstStyle/>
+          <a:p>
+            <a:pPr algn="ctr"/>
+            <a:r>
+              <a:rPr lang="en-GB" b="1" dirty="0"/>
+              <a:t>sig</a:t>
+            </a:r>
+          </a:p>
+        </p:txBody>
+      </p:sp>
+      <p:sp>
+        <p:nvSpPr>
+          <p:cNvPr id="24" name="Rectangle 23">
+            <a:extLst>
+              <a:ext uri="{FF2B5EF4-FFF2-40B4-BE49-F238E27FC236}">
+                <a16:creationId xmlns:a16="http://schemas.microsoft.com/office/drawing/2014/main" id="{B630249C-8733-251F-8F8E-7320C25C4249}"/>
+              </a:ext>
+            </a:extLst>
+          </p:cNvPr>
+          <p:cNvSpPr/>
+          <p:nvPr/>
+        </p:nvSpPr>
+        <p:spPr>
+          <a:xfrm>
+            <a:off x="5436963" y="5061950"/>
+            <a:ext cx="1319915" cy="675861"/>
+          </a:xfrm>
+          <a:prstGeom prst="rect">
+            <a:avLst/>
+          </a:prstGeom>
+        </p:spPr>
+        <p:style>
+          <a:lnRef idx="2">
+            <a:schemeClr val="accent1">
+              <a:shade val="15000"/>
+            </a:schemeClr>
+          </a:lnRef>
+          <a:fillRef idx="1">
+            <a:schemeClr val="accent1"/>
+          </a:fillRef>
+          <a:effectRef idx="0">
+            <a:schemeClr val="accent1"/>
+          </a:effectRef>
+          <a:fontRef idx="minor">
+            <a:schemeClr val="lt1"/>
+          </a:fontRef>
+        </p:style>
+        <p:txBody>
+          <a:bodyPr rtlCol="0" anchor="ctr"/>
+          <a:lstStyle/>
+          <a:p>
+            <a:pPr algn="ctr"/>
+            <a:r>
+              <a:rPr lang="en-GB" b="1" dirty="0"/>
+              <a:t>Kidney</a:t>
+            </a:r>
+          </a:p>
+          <a:p>
+            <a:pPr algn="ctr"/>
+            <a:r>
+              <a:rPr lang="en-GB" b="1" dirty="0"/>
+              <a:t>TODO</a:t>
+            </a:r>
+          </a:p>
+        </p:txBody>
+      </p:sp>
+      <p:cxnSp>
+        <p:nvCxnSpPr>
+          <p:cNvPr id="25" name="Straight Arrow Connector 24">
+            <a:extLst>
+              <a:ext uri="{FF2B5EF4-FFF2-40B4-BE49-F238E27FC236}">
+                <a16:creationId xmlns:a16="http://schemas.microsoft.com/office/drawing/2014/main" id="{F5B444E2-C28C-3469-797F-65E06DBF7AD4}"/>
+              </a:ext>
+            </a:extLst>
+          </p:cNvPr>
+          <p:cNvCxnSpPr>
+            <a:cxnSpLocks/>
+            <a:stCxn id="4" idx="2"/>
+            <a:endCxn id="24" idx="0"/>
+          </p:cNvCxnSpPr>
+          <p:nvPr/>
+        </p:nvCxnSpPr>
+        <p:spPr>
+          <a:xfrm>
+            <a:off x="4670825" y="3289564"/>
+            <a:ext cx="1426096" cy="1772386"/>
+          </a:xfrm>
+          <a:prstGeom prst="straightConnector1">
+            <a:avLst/>
+          </a:prstGeom>
+          <a:ln w="76200">
+            <a:tailEnd type="triangle"/>
+          </a:ln>
+        </p:spPr>
+        <p:style>
+          <a:lnRef idx="2">
+            <a:schemeClr val="accent1"/>
+          </a:lnRef>
+          <a:fillRef idx="0">
+            <a:schemeClr val="accent1"/>
+          </a:fillRef>
+          <a:effectRef idx="1">
+            <a:schemeClr val="accent1"/>
+          </a:effectRef>
+          <a:fontRef idx="minor">
+            <a:schemeClr val="tx1"/>
+          </a:fontRef>
+        </p:style>
+      </p:cxnSp>
+      <p:sp>
+        <p:nvSpPr>
+          <p:cNvPr id="30" name="Rectangle 29">
+            <a:extLst>
+              <a:ext uri="{FF2B5EF4-FFF2-40B4-BE49-F238E27FC236}">
+                <a16:creationId xmlns:a16="http://schemas.microsoft.com/office/drawing/2014/main" id="{87108D8D-2098-5BF9-BE26-2B2AD88A02C7}"/>
+              </a:ext>
+            </a:extLst>
+          </p:cNvPr>
+          <p:cNvSpPr/>
+          <p:nvPr/>
+        </p:nvSpPr>
+        <p:spPr>
+          <a:xfrm>
+            <a:off x="8086096" y="5047564"/>
+            <a:ext cx="1319915" cy="675861"/>
+          </a:xfrm>
+          <a:prstGeom prst="rect">
+            <a:avLst/>
+          </a:prstGeom>
+        </p:spPr>
+        <p:style>
+          <a:lnRef idx="2">
+            <a:schemeClr val="accent1">
+              <a:shade val="15000"/>
+            </a:schemeClr>
+          </a:lnRef>
+          <a:fillRef idx="1">
+            <a:schemeClr val="accent1"/>
+          </a:fillRef>
+          <a:effectRef idx="0">
+            <a:schemeClr val="accent1"/>
+          </a:effectRef>
+          <a:fontRef idx="minor">
+            <a:schemeClr val="lt1"/>
+          </a:fontRef>
+        </p:style>
+        <p:txBody>
+          <a:bodyPr rtlCol="0" anchor="ctr"/>
+          <a:lstStyle/>
+          <a:p>
+            <a:pPr algn="ctr"/>
+            <a:r>
+              <a:rPr lang="en-GB" b="1" dirty="0"/>
+              <a:t>Tissue</a:t>
+            </a:r>
+          </a:p>
+          <a:p>
+            <a:pPr algn="ctr"/>
+            <a:r>
+              <a:rPr lang="en-GB" b="1" dirty="0"/>
+              <a:t>TODO</a:t>
+            </a:r>
+          </a:p>
+        </p:txBody>
+      </p:sp>
+      <p:cxnSp>
+        <p:nvCxnSpPr>
+          <p:cNvPr id="31" name="Straight Arrow Connector 30">
+            <a:extLst>
+              <a:ext uri="{FF2B5EF4-FFF2-40B4-BE49-F238E27FC236}">
+                <a16:creationId xmlns:a16="http://schemas.microsoft.com/office/drawing/2014/main" id="{ADA43295-0A06-ED14-155D-26B407C8C5B7}"/>
+              </a:ext>
+            </a:extLst>
+          </p:cNvPr>
+          <p:cNvCxnSpPr>
+            <a:cxnSpLocks/>
+            <a:stCxn id="16" idx="2"/>
+            <a:endCxn id="30" idx="0"/>
+          </p:cNvCxnSpPr>
+          <p:nvPr/>
+        </p:nvCxnSpPr>
+        <p:spPr>
+          <a:xfrm flipH="1">
+            <a:off x="8746054" y="1502795"/>
+            <a:ext cx="351185" cy="3544769"/>
+          </a:xfrm>
+          <a:prstGeom prst="straightConnector1">
+            <a:avLst/>
+          </a:prstGeom>
+          <a:ln w="76200">
+            <a:tailEnd type="triangle"/>
+          </a:ln>
+        </p:spPr>
+        <p:style>
+          <a:lnRef idx="2">
+            <a:schemeClr val="accent1"/>
+          </a:lnRef>
+          <a:fillRef idx="0">
+            <a:schemeClr val="accent1"/>
+          </a:fillRef>
+          <a:effectRef idx="1">
+            <a:schemeClr val="accent1"/>
+          </a:effectRef>
+          <a:fontRef idx="minor">
+            <a:schemeClr val="tx1"/>
+          </a:fontRef>
+        </p:style>
+      </p:cxnSp>
+      <p:cxnSp>
+        <p:nvCxnSpPr>
+          <p:cNvPr id="34" name="Straight Arrow Connector 33">
+            <a:extLst>
+              <a:ext uri="{FF2B5EF4-FFF2-40B4-BE49-F238E27FC236}">
+                <a16:creationId xmlns:a16="http://schemas.microsoft.com/office/drawing/2014/main" id="{D6DBB396-8947-ADFE-B918-4D962DF1376D}"/>
+              </a:ext>
+            </a:extLst>
+          </p:cNvPr>
+          <p:cNvCxnSpPr>
+            <a:cxnSpLocks/>
+            <a:stCxn id="9" idx="2"/>
+            <a:endCxn id="30" idx="0"/>
+          </p:cNvCxnSpPr>
+          <p:nvPr/>
+        </p:nvCxnSpPr>
+        <p:spPr>
+          <a:xfrm>
+            <a:off x="7346864" y="1502794"/>
+            <a:ext cx="1399190" cy="3544770"/>
+          </a:xfrm>
+          <a:prstGeom prst="straightConnector1">
+            <a:avLst/>
+          </a:prstGeom>
+          <a:ln w="76200">
+            <a:tailEnd type="triangle"/>
+          </a:ln>
+        </p:spPr>
+        <p:style>
+          <a:lnRef idx="2">
+            <a:schemeClr val="accent1"/>
+          </a:lnRef>
+          <a:fillRef idx="0">
+            <a:schemeClr val="accent1"/>
+          </a:fillRef>
+          <a:effectRef idx="1">
+            <a:schemeClr val="accent1"/>
+          </a:effectRef>
+          <a:fontRef idx="minor">
+            <a:schemeClr val="tx1"/>
+          </a:fontRef>
+        </p:style>
+      </p:cxnSp>
+      <p:cxnSp>
+        <p:nvCxnSpPr>
+          <p:cNvPr id="42" name="Straight Arrow Connector 41">
+            <a:extLst>
+              <a:ext uri="{FF2B5EF4-FFF2-40B4-BE49-F238E27FC236}">
+                <a16:creationId xmlns:a16="http://schemas.microsoft.com/office/drawing/2014/main" id="{FCCD147D-1988-E5E7-5C82-082145021466}"/>
+              </a:ext>
+            </a:extLst>
+          </p:cNvPr>
+          <p:cNvCxnSpPr>
+            <a:cxnSpLocks/>
+            <a:stCxn id="4" idx="2"/>
+            <a:endCxn id="30" idx="0"/>
+          </p:cNvCxnSpPr>
+          <p:nvPr/>
+        </p:nvCxnSpPr>
+        <p:spPr>
+          <a:xfrm>
+            <a:off x="4670825" y="3289564"/>
+            <a:ext cx="4075229" cy="1758000"/>
+          </a:xfrm>
+          <a:prstGeom prst="straightConnector1">
+            <a:avLst/>
+          </a:prstGeom>
+          <a:ln w="76200">
+            <a:tailEnd type="triangle"/>
+          </a:ln>
+        </p:spPr>
+        <p:style>
+          <a:lnRef idx="2">
+            <a:schemeClr val="accent1"/>
+          </a:lnRef>
+          <a:fillRef idx="0">
+            <a:schemeClr val="accent1"/>
+          </a:fillRef>
+          <a:effectRef idx="1">
+            <a:schemeClr val="accent1"/>
+          </a:effectRef>
+          <a:fontRef idx="minor">
+            <a:schemeClr val="tx1"/>
+          </a:fontRef>
+        </p:style>
+      </p:cxnSp>
+      <p:cxnSp>
+        <p:nvCxnSpPr>
+          <p:cNvPr id="67" name="Straight Arrow Connector 66">
+            <a:extLst>
+              <a:ext uri="{FF2B5EF4-FFF2-40B4-BE49-F238E27FC236}">
+                <a16:creationId xmlns:a16="http://schemas.microsoft.com/office/drawing/2014/main" id="{7132B5B3-9E4E-8867-D4A3-1E777AF6B917}"/>
+              </a:ext>
+            </a:extLst>
+          </p:cNvPr>
+          <p:cNvCxnSpPr>
+            <a:cxnSpLocks/>
+            <a:stCxn id="3" idx="2"/>
+            <a:endCxn id="30" idx="0"/>
+          </p:cNvCxnSpPr>
+          <p:nvPr/>
+        </p:nvCxnSpPr>
+        <p:spPr>
+          <a:xfrm>
+            <a:off x="5399881" y="1502794"/>
+            <a:ext cx="3346173" cy="3544770"/>
+          </a:xfrm>
+          <a:prstGeom prst="straightConnector1">
+            <a:avLst/>
+          </a:prstGeom>
+          <a:ln w="76200">
+            <a:tailEnd type="triangle"/>
+          </a:ln>
+        </p:spPr>
+        <p:style>
+          <a:lnRef idx="2">
+            <a:schemeClr val="accent1"/>
+          </a:lnRef>
+          <a:fillRef idx="0">
+            <a:schemeClr val="accent1"/>
+          </a:fillRef>
+          <a:effectRef idx="1">
+            <a:schemeClr val="accent1"/>
+          </a:effectRef>
+          <a:fontRef idx="minor">
+            <a:schemeClr val="tx1"/>
+          </a:fontRef>
+        </p:style>
+      </p:cxnSp>
+    </p:spTree>
+    <p:extLst>
+      <p:ext uri="{BB962C8B-B14F-4D97-AF65-F5344CB8AC3E}">
+        <p14:creationId xmlns:p14="http://schemas.microsoft.com/office/powerpoint/2010/main" val="940074334"/>
       </p:ext>
     </p:extLst>
   </p:cSld>

</xml_diff>

<commit_message>
kidney cort med rename
</commit_message>
<xml_diff>
--- a/docs/source/diagrams.pptx
+++ b/docs/source/diagrams.pptx
@@ -256,7 +256,7 @@
           <a:p>
             <a:fld id="{03C483EE-6330-45F5-89B7-D6BA7E3B4FCB}" type="datetimeFigureOut">
               <a:rPr lang="en-GB" smtClean="0"/>
-              <a:t>15/01/2025</a:t>
+              <a:t>24/01/2025</a:t>
             </a:fld>
             <a:endParaRPr lang="en-GB"/>
           </a:p>
@@ -426,7 +426,7 @@
           <a:p>
             <a:fld id="{03C483EE-6330-45F5-89B7-D6BA7E3B4FCB}" type="datetimeFigureOut">
               <a:rPr lang="en-GB" smtClean="0"/>
-              <a:t>15/01/2025</a:t>
+              <a:t>24/01/2025</a:t>
             </a:fld>
             <a:endParaRPr lang="en-GB"/>
           </a:p>
@@ -606,7 +606,7 @@
           <a:p>
             <a:fld id="{03C483EE-6330-45F5-89B7-D6BA7E3B4FCB}" type="datetimeFigureOut">
               <a:rPr lang="en-GB" smtClean="0"/>
-              <a:t>15/01/2025</a:t>
+              <a:t>24/01/2025</a:t>
             </a:fld>
             <a:endParaRPr lang="en-GB"/>
           </a:p>
@@ -776,7 +776,7 @@
           <a:p>
             <a:fld id="{03C483EE-6330-45F5-89B7-D6BA7E3B4FCB}" type="datetimeFigureOut">
               <a:rPr lang="en-GB" smtClean="0"/>
-              <a:t>15/01/2025</a:t>
+              <a:t>24/01/2025</a:t>
             </a:fld>
             <a:endParaRPr lang="en-GB"/>
           </a:p>
@@ -1022,7 +1022,7 @@
           <a:p>
             <a:fld id="{03C483EE-6330-45F5-89B7-D6BA7E3B4FCB}" type="datetimeFigureOut">
               <a:rPr lang="en-GB" smtClean="0"/>
-              <a:t>15/01/2025</a:t>
+              <a:t>24/01/2025</a:t>
             </a:fld>
             <a:endParaRPr lang="en-GB"/>
           </a:p>
@@ -1254,7 +1254,7 @@
           <a:p>
             <a:fld id="{03C483EE-6330-45F5-89B7-D6BA7E3B4FCB}" type="datetimeFigureOut">
               <a:rPr lang="en-GB" smtClean="0"/>
-              <a:t>15/01/2025</a:t>
+              <a:t>24/01/2025</a:t>
             </a:fld>
             <a:endParaRPr lang="en-GB"/>
           </a:p>
@@ -1621,7 +1621,7 @@
           <a:p>
             <a:fld id="{03C483EE-6330-45F5-89B7-D6BA7E3B4FCB}" type="datetimeFigureOut">
               <a:rPr lang="en-GB" smtClean="0"/>
-              <a:t>15/01/2025</a:t>
+              <a:t>24/01/2025</a:t>
             </a:fld>
             <a:endParaRPr lang="en-GB"/>
           </a:p>
@@ -1739,7 +1739,7 @@
           <a:p>
             <a:fld id="{03C483EE-6330-45F5-89B7-D6BA7E3B4FCB}" type="datetimeFigureOut">
               <a:rPr lang="en-GB" smtClean="0"/>
-              <a:t>15/01/2025</a:t>
+              <a:t>24/01/2025</a:t>
             </a:fld>
             <a:endParaRPr lang="en-GB"/>
           </a:p>
@@ -1834,7 +1834,7 @@
           <a:p>
             <a:fld id="{03C483EE-6330-45F5-89B7-D6BA7E3B4FCB}" type="datetimeFigureOut">
               <a:rPr lang="en-GB" smtClean="0"/>
-              <a:t>15/01/2025</a:t>
+              <a:t>24/01/2025</a:t>
             </a:fld>
             <a:endParaRPr lang="en-GB"/>
           </a:p>
@@ -2111,7 +2111,7 @@
           <a:p>
             <a:fld id="{03C483EE-6330-45F5-89B7-D6BA7E3B4FCB}" type="datetimeFigureOut">
               <a:rPr lang="en-GB" smtClean="0"/>
-              <a:t>15/01/2025</a:t>
+              <a:t>24/01/2025</a:t>
             </a:fld>
             <a:endParaRPr lang="en-GB"/>
           </a:p>
@@ -2368,7 +2368,7 @@
           <a:p>
             <a:fld id="{03C483EE-6330-45F5-89B7-D6BA7E3B4FCB}" type="datetimeFigureOut">
               <a:rPr lang="en-GB" smtClean="0"/>
-              <a:t>15/01/2025</a:t>
+              <a:t>24/01/2025</a:t>
             </a:fld>
             <a:endParaRPr lang="en-GB"/>
           </a:p>
@@ -2581,7 +2581,7 @@
           <a:p>
             <a:fld id="{03C483EE-6330-45F5-89B7-D6BA7E3B4FCB}" type="datetimeFigureOut">
               <a:rPr lang="en-GB" smtClean="0"/>
-              <a:t>15/01/2025</a:t>
+              <a:t>24/01/2025</a:t>
             </a:fld>
             <a:endParaRPr lang="en-GB"/>
           </a:p>
@@ -6070,13 +6070,6 @@
             <a:r>
               <a:rPr lang="en-GB" b="1" dirty="0"/>
               <a:t>Tissue</a:t>
-            </a:r>
-          </a:p>
-          <a:p>
-            <a:pPr algn="ctr"/>
-            <a:r>
-              <a:rPr lang="en-GB" b="1" dirty="0"/>
-              <a:t>TODO</a:t>
             </a:r>
           </a:p>
         </p:txBody>

</xml_diff>